<commit_message>
add animateInSlide FT case
</commit_message>
<xml_diff>
--- a/doc/test/AnimateInSlide.pptx
+++ b/doc/test/AnimateInSlide.pptx
@@ -14,7 +14,7 @@
     <p:sldId id="256" r:id="rId5"/>
     <p:sldId id="292" r:id="rId6"/>
     <p:sldId id="341" r:id="rId7"/>
-    <p:sldId id="344" r:id="rId8"/>
+    <p:sldId id="352" r:id="rId8"/>
     <p:sldId id="332" r:id="rId9"/>
     <p:sldId id="343" r:id="rId10"/>
     <p:sldId id="345" r:id="rId11"/>
@@ -138,7 +138,7 @@
             <p14:sldId id="256"/>
             <p14:sldId id="292"/>
             <p14:sldId id="341"/>
-            <p14:sldId id="344"/>
+            <p14:sldId id="352"/>
             <p14:sldId id="332"/>
             <p14:sldId id="343"/>
             <p14:sldId id="345"/>
@@ -697,7 +697,7 @@
           <a:p>
             <a:fld id="{48E32F65-35C4-4EA7-AB30-C882F6C87A5D}" type="datetimeFigureOut">
               <a:rPr lang="en-SG" smtClean="0"/>
-              <a:t>26/3/2014</a:t>
+              <a:t>11/6/2015</a:t>
             </a:fld>
             <a:endParaRPr lang="en-SG"/>
           </a:p>
@@ -1584,7 +1584,7 @@
           <a:p>
             <a:fld id="{699DC775-C286-4358-8C92-D7E584E969B3}" type="datetimeFigureOut">
               <a:rPr lang="en-US" smtClean="0"/>
-              <a:t>3/26/2014</a:t>
+              <a:t>6/11/2015</a:t>
             </a:fld>
             <a:endParaRPr lang="en-US"/>
           </a:p>
@@ -1754,7 +1754,7 @@
           <a:p>
             <a:fld id="{699DC775-C286-4358-8C92-D7E584E969B3}" type="datetimeFigureOut">
               <a:rPr lang="en-US" smtClean="0"/>
-              <a:t>3/26/2014</a:t>
+              <a:t>6/11/2015</a:t>
             </a:fld>
             <a:endParaRPr lang="en-US"/>
           </a:p>
@@ -1934,7 +1934,7 @@
           <a:p>
             <a:fld id="{699DC775-C286-4358-8C92-D7E584E969B3}" type="datetimeFigureOut">
               <a:rPr lang="en-US" smtClean="0"/>
-              <a:t>3/26/2014</a:t>
+              <a:t>6/11/2015</a:t>
             </a:fld>
             <a:endParaRPr lang="en-US"/>
           </a:p>
@@ -2176,7 +2176,7 @@
           <a:p>
             <a:fld id="{699DC775-C286-4358-8C92-D7E584E969B3}" type="datetimeFigureOut">
               <a:rPr lang="en-US" smtClean="0"/>
-              <a:t>3/26/2014</a:t>
+              <a:t>6/11/2015</a:t>
             </a:fld>
             <a:endParaRPr lang="en-US"/>
           </a:p>
@@ -2346,7 +2346,7 @@
           <a:p>
             <a:fld id="{699DC775-C286-4358-8C92-D7E584E969B3}" type="datetimeFigureOut">
               <a:rPr lang="en-US" smtClean="0"/>
-              <a:t>3/26/2014</a:t>
+              <a:t>6/11/2015</a:t>
             </a:fld>
             <a:endParaRPr lang="en-US"/>
           </a:p>
@@ -2592,7 +2592,7 @@
           <a:p>
             <a:fld id="{699DC775-C286-4358-8C92-D7E584E969B3}" type="datetimeFigureOut">
               <a:rPr lang="en-US" smtClean="0"/>
-              <a:t>3/26/2014</a:t>
+              <a:t>6/11/2015</a:t>
             </a:fld>
             <a:endParaRPr lang="en-US"/>
           </a:p>
@@ -2880,7 +2880,7 @@
           <a:p>
             <a:fld id="{699DC775-C286-4358-8C92-D7E584E969B3}" type="datetimeFigureOut">
               <a:rPr lang="en-US" smtClean="0"/>
-              <a:t>3/26/2014</a:t>
+              <a:t>6/11/2015</a:t>
             </a:fld>
             <a:endParaRPr lang="en-US"/>
           </a:p>
@@ -3302,7 +3302,7 @@
           <a:p>
             <a:fld id="{699DC775-C286-4358-8C92-D7E584E969B3}" type="datetimeFigureOut">
               <a:rPr lang="en-US" smtClean="0"/>
-              <a:t>3/26/2014</a:t>
+              <a:t>6/11/2015</a:t>
             </a:fld>
             <a:endParaRPr lang="en-US"/>
           </a:p>
@@ -3420,7 +3420,7 @@
           <a:p>
             <a:fld id="{699DC775-C286-4358-8C92-D7E584E969B3}" type="datetimeFigureOut">
               <a:rPr lang="en-US" smtClean="0"/>
-              <a:t>3/26/2014</a:t>
+              <a:t>6/11/2015</a:t>
             </a:fld>
             <a:endParaRPr lang="en-US"/>
           </a:p>
@@ -3515,7 +3515,7 @@
           <a:p>
             <a:fld id="{699DC775-C286-4358-8C92-D7E584E969B3}" type="datetimeFigureOut">
               <a:rPr lang="en-US" smtClean="0"/>
-              <a:t>3/26/2014</a:t>
+              <a:t>6/11/2015</a:t>
             </a:fld>
             <a:endParaRPr lang="en-US"/>
           </a:p>
@@ -3792,7 +3792,7 @@
           <a:p>
             <a:fld id="{699DC775-C286-4358-8C92-D7E584E969B3}" type="datetimeFigureOut">
               <a:rPr lang="en-US" smtClean="0"/>
-              <a:t>3/26/2014</a:t>
+              <a:t>6/11/2015</a:t>
             </a:fld>
             <a:endParaRPr lang="en-US"/>
           </a:p>
@@ -3962,7 +3962,7 @@
           <a:p>
             <a:fld id="{699DC775-C286-4358-8C92-D7E584E969B3}" type="datetimeFigureOut">
               <a:rPr lang="en-US" smtClean="0"/>
-              <a:t>3/26/2014</a:t>
+              <a:t>6/11/2015</a:t>
             </a:fld>
             <a:endParaRPr lang="en-US"/>
           </a:p>
@@ -4215,7 +4215,7 @@
           <a:p>
             <a:fld id="{699DC775-C286-4358-8C92-D7E584E969B3}" type="datetimeFigureOut">
               <a:rPr lang="en-US" smtClean="0"/>
-              <a:t>3/26/2014</a:t>
+              <a:t>6/11/2015</a:t>
             </a:fld>
             <a:endParaRPr lang="en-US"/>
           </a:p>
@@ -4385,7 +4385,7 @@
           <a:p>
             <a:fld id="{699DC775-C286-4358-8C92-D7E584E969B3}" type="datetimeFigureOut">
               <a:rPr lang="en-US" smtClean="0"/>
-              <a:t>3/26/2014</a:t>
+              <a:t>6/11/2015</a:t>
             </a:fld>
             <a:endParaRPr lang="en-US"/>
           </a:p>
@@ -4565,7 +4565,7 @@
           <a:p>
             <a:fld id="{699DC775-C286-4358-8C92-D7E584E969B3}" type="datetimeFigureOut">
               <a:rPr lang="en-US" smtClean="0"/>
-              <a:t>3/26/2014</a:t>
+              <a:t>6/11/2015</a:t>
             </a:fld>
             <a:endParaRPr lang="en-US"/>
           </a:p>
@@ -4815,7 +4815,7 @@
           <a:p>
             <a:fld id="{699DC775-C286-4358-8C92-D7E584E969B3}" type="datetimeFigureOut">
               <a:rPr lang="en-US" smtClean="0"/>
-              <a:t>3/26/2014</a:t>
+              <a:t>6/11/2015</a:t>
             </a:fld>
             <a:endParaRPr lang="en-US"/>
           </a:p>
@@ -4993,7 +4993,7 @@
           <a:p>
             <a:fld id="{699DC775-C286-4358-8C92-D7E584E969B3}" type="datetimeFigureOut">
               <a:rPr lang="en-US" smtClean="0"/>
-              <a:t>3/26/2014</a:t>
+              <a:t>6/11/2015</a:t>
             </a:fld>
             <a:endParaRPr lang="en-US"/>
           </a:p>
@@ -5247,7 +5247,7 @@
           <a:p>
             <a:fld id="{699DC775-C286-4358-8C92-D7E584E969B3}" type="datetimeFigureOut">
               <a:rPr lang="en-US" smtClean="0"/>
-              <a:t>3/26/2014</a:t>
+              <a:t>6/11/2015</a:t>
             </a:fld>
             <a:endParaRPr lang="en-US"/>
           </a:p>
@@ -5543,7 +5543,7 @@
           <a:p>
             <a:fld id="{699DC775-C286-4358-8C92-D7E584E969B3}" type="datetimeFigureOut">
               <a:rPr lang="en-US" smtClean="0"/>
-              <a:t>3/26/2014</a:t>
+              <a:t>6/11/2015</a:t>
             </a:fld>
             <a:endParaRPr lang="en-US"/>
           </a:p>
@@ -5973,7 +5973,7 @@
           <a:p>
             <a:fld id="{699DC775-C286-4358-8C92-D7E584E969B3}" type="datetimeFigureOut">
               <a:rPr lang="en-US" smtClean="0"/>
-              <a:t>3/26/2014</a:t>
+              <a:t>6/11/2015</a:t>
             </a:fld>
             <a:endParaRPr lang="en-US"/>
           </a:p>
@@ -6099,7 +6099,7 @@
           <a:p>
             <a:fld id="{699DC775-C286-4358-8C92-D7E584E969B3}" type="datetimeFigureOut">
               <a:rPr lang="en-US" smtClean="0"/>
-              <a:t>3/26/2014</a:t>
+              <a:t>6/11/2015</a:t>
             </a:fld>
             <a:endParaRPr lang="en-US"/>
           </a:p>
@@ -6202,7 +6202,7 @@
           <a:p>
             <a:fld id="{699DC775-C286-4358-8C92-D7E584E969B3}" type="datetimeFigureOut">
               <a:rPr lang="en-US" smtClean="0"/>
-              <a:t>3/26/2014</a:t>
+              <a:t>6/11/2015</a:t>
             </a:fld>
             <a:endParaRPr lang="en-US"/>
           </a:p>
@@ -6448,7 +6448,7 @@
           <a:p>
             <a:fld id="{699DC775-C286-4358-8C92-D7E584E969B3}" type="datetimeFigureOut">
               <a:rPr lang="en-US" smtClean="0"/>
-              <a:t>3/26/2014</a:t>
+              <a:t>6/11/2015</a:t>
             </a:fld>
             <a:endParaRPr lang="en-US"/>
           </a:p>
@@ -6733,7 +6733,7 @@
           <a:p>
             <a:fld id="{699DC775-C286-4358-8C92-D7E584E969B3}" type="datetimeFigureOut">
               <a:rPr lang="en-US" smtClean="0"/>
-              <a:t>3/26/2014</a:t>
+              <a:t>6/11/2015</a:t>
             </a:fld>
             <a:endParaRPr lang="en-US"/>
           </a:p>
@@ -6994,7 +6994,7 @@
           <a:p>
             <a:fld id="{699DC775-C286-4358-8C92-D7E584E969B3}" type="datetimeFigureOut">
               <a:rPr lang="en-US" smtClean="0"/>
-              <a:t>3/26/2014</a:t>
+              <a:t>6/11/2015</a:t>
             </a:fld>
             <a:endParaRPr lang="en-US"/>
           </a:p>
@@ -7172,7 +7172,7 @@
           <a:p>
             <a:fld id="{699DC775-C286-4358-8C92-D7E584E969B3}" type="datetimeFigureOut">
               <a:rPr lang="en-US" smtClean="0"/>
-              <a:t>3/26/2014</a:t>
+              <a:t>6/11/2015</a:t>
             </a:fld>
             <a:endParaRPr lang="en-US"/>
           </a:p>
@@ -7360,7 +7360,7 @@
           <a:p>
             <a:fld id="{699DC775-C286-4358-8C92-D7E584E969B3}" type="datetimeFigureOut">
               <a:rPr lang="en-US" smtClean="0"/>
-              <a:t>3/26/2014</a:t>
+              <a:t>6/11/2015</a:t>
             </a:fld>
             <a:endParaRPr lang="en-US"/>
           </a:p>
@@ -7648,7 +7648,7 @@
           <a:p>
             <a:fld id="{699DC775-C286-4358-8C92-D7E584E969B3}" type="datetimeFigureOut">
               <a:rPr lang="en-US" smtClean="0"/>
-              <a:t>3/26/2014</a:t>
+              <a:t>6/11/2015</a:t>
             </a:fld>
             <a:endParaRPr lang="en-US"/>
           </a:p>
@@ -8070,7 +8070,7 @@
           <a:p>
             <a:fld id="{699DC775-C286-4358-8C92-D7E584E969B3}" type="datetimeFigureOut">
               <a:rPr lang="en-US" smtClean="0"/>
-              <a:t>3/26/2014</a:t>
+              <a:t>6/11/2015</a:t>
             </a:fld>
             <a:endParaRPr lang="en-US"/>
           </a:p>
@@ -8188,7 +8188,7 @@
           <a:p>
             <a:fld id="{699DC775-C286-4358-8C92-D7E584E969B3}" type="datetimeFigureOut">
               <a:rPr lang="en-US" smtClean="0"/>
-              <a:t>3/26/2014</a:t>
+              <a:t>6/11/2015</a:t>
             </a:fld>
             <a:endParaRPr lang="en-US"/>
           </a:p>
@@ -8283,7 +8283,7 @@
           <a:p>
             <a:fld id="{699DC775-C286-4358-8C92-D7E584E969B3}" type="datetimeFigureOut">
               <a:rPr lang="en-US" smtClean="0"/>
-              <a:t>3/26/2014</a:t>
+              <a:t>6/11/2015</a:t>
             </a:fld>
             <a:endParaRPr lang="en-US"/>
           </a:p>
@@ -8560,7 +8560,7 @@
           <a:p>
             <a:fld id="{699DC775-C286-4358-8C92-D7E584E969B3}" type="datetimeFigureOut">
               <a:rPr lang="en-US" smtClean="0"/>
-              <a:t>3/26/2014</a:t>
+              <a:t>6/11/2015</a:t>
             </a:fld>
             <a:endParaRPr lang="en-US"/>
           </a:p>
@@ -8813,7 +8813,7 @@
           <a:p>
             <a:fld id="{699DC775-C286-4358-8C92-D7E584E969B3}" type="datetimeFigureOut">
               <a:rPr lang="en-US" smtClean="0"/>
-              <a:t>3/26/2014</a:t>
+              <a:t>6/11/2015</a:t>
             </a:fld>
             <a:endParaRPr lang="en-US"/>
           </a:p>
@@ -9026,7 +9026,7 @@
           <a:p>
             <a:fld id="{699DC775-C286-4358-8C92-D7E584E969B3}" type="datetimeFigureOut">
               <a:rPr lang="en-US" smtClean="0"/>
-              <a:t>3/26/2014</a:t>
+              <a:t>6/11/2015</a:t>
             </a:fld>
             <a:endParaRPr lang="en-US"/>
           </a:p>
@@ -9541,7 +9541,7 @@
           <a:p>
             <a:fld id="{699DC775-C286-4358-8C92-D7E584E969B3}" type="datetimeFigureOut">
               <a:rPr lang="en-US" smtClean="0"/>
-              <a:t>3/26/2014</a:t>
+              <a:t>6/11/2015</a:t>
             </a:fld>
             <a:endParaRPr lang="en-US"/>
           </a:p>
@@ -10054,7 +10054,7 @@
           <a:p>
             <a:fld id="{699DC775-C286-4358-8C92-D7E584E969B3}" type="datetimeFigureOut">
               <a:rPr lang="en-US" smtClean="0"/>
-              <a:t>3/26/2014</a:t>
+              <a:t>6/11/2015</a:t>
             </a:fld>
             <a:endParaRPr lang="en-US"/>
           </a:p>
@@ -14948,11 +14948,7 @@
           <a:p>
             <a:r>
               <a:rPr lang="en-US" dirty="0" smtClean="0"/>
-              <a:t>Select </a:t>
-            </a:r>
-            <a:r>
-              <a:rPr lang="en-US" dirty="0" smtClean="0"/>
-              <a:t>shapes sequentially in the initial slide and click ‘Animate </a:t>
+              <a:t>Select shapes sequentially in the initial slide and click ‘Animate </a:t>
             </a:r>
             <a:r>
               <a:rPr lang="en-US" dirty="0"/>
@@ -14962,7 +14958,6 @@
               <a:rPr lang="en-US" dirty="0" smtClean="0"/>
               <a:t>n Slide’ button.</a:t>
             </a:r>
-            <a:endParaRPr lang="en-US" dirty="0" smtClean="0"/>
           </a:p>
           <a:p>
             <a:r>
@@ -18510,11 +18505,11 @@
   <p:clrMapOvr>
     <a:masterClrMapping/>
   </p:clrMapOvr>
-  <mc:AlternateContent xmlns:mc="http://schemas.openxmlformats.org/markup-compatibility/2006">
-    <mc:Choice xmlns:p14="http://schemas.microsoft.com/office/powerpoint/2010/main" Requires="p14">
+  <mc:AlternateContent xmlns:mc="http://schemas.openxmlformats.org/markup-compatibility/2006" xmlns:p14="http://schemas.microsoft.com/office/powerpoint/2010/main">
+    <mc:Choice Requires="p14">
       <p:transition spd="slow" p14:dur="2000"/>
     </mc:Choice>
-    <mc:Fallback>
+    <mc:Fallback xmlns="">
       <p:transition spd="slow"/>
     </mc:Fallback>
   </mc:AlternateContent>
@@ -22675,11 +22670,11 @@
   <p:clrMapOvr>
     <a:masterClrMapping/>
   </p:clrMapOvr>
-  <mc:AlternateContent xmlns:mc="http://schemas.openxmlformats.org/markup-compatibility/2006">
-    <mc:Choice xmlns:p14="http://schemas.microsoft.com/office/powerpoint/2010/main" Requires="p14">
+  <mc:AlternateContent xmlns:mc="http://schemas.openxmlformats.org/markup-compatibility/2006" xmlns:p14="http://schemas.microsoft.com/office/powerpoint/2010/main">
+    <mc:Choice Requires="p14">
       <p:transition spd="slow" p14:dur="2000" advClick="0" advTm="0"/>
     </mc:Choice>
-    <mc:Fallback>
+    <mc:Fallback xmlns="">
       <p:transition spd="slow" advClick="0" advTm="0"/>
     </mc:Fallback>
   </mc:AlternateContent>
@@ -23263,31 +23258,7 @@
                   <a:schemeClr val="bg1"/>
                 </a:solidFill>
               </a:rPr>
-              <a:t>Select </a:t>
-            </a:r>
-            <a:r>
-              <a:rPr lang="en-US" sz="2400" dirty="0" smtClean="0">
-                <a:solidFill>
-                  <a:schemeClr val="bg1"/>
-                </a:solidFill>
-              </a:rPr>
-              <a:t>shapes sequentially according to </a:t>
-            </a:r>
-            <a:r>
-              <a:rPr lang="en-US" sz="2400" dirty="0" smtClean="0">
-                <a:solidFill>
-                  <a:schemeClr val="bg1"/>
-                </a:solidFill>
-              </a:rPr>
-              <a:t>their</a:t>
-            </a:r>
-            <a:r>
-              <a:rPr lang="en-US" sz="2400" dirty="0" smtClean="0">
-                <a:solidFill>
-                  <a:schemeClr val="bg1"/>
-                </a:solidFill>
-              </a:rPr>
-              <a:t> indexes</a:t>
+              <a:t>Select shapes sequentially according to their indexes</a:t>
             </a:r>
             <a:r>
               <a:rPr lang="en-US" sz="2400" b="1" dirty="0" smtClean="0">
@@ -23322,23 +23293,7 @@
                   <a:schemeClr val="bg1"/>
                 </a:solidFill>
               </a:rPr>
-              <a:t>“Animate </a:t>
-            </a:r>
-            <a:r>
-              <a:rPr lang="en-US" sz="2400" b="1" dirty="0" smtClean="0">
-                <a:solidFill>
-                  <a:schemeClr val="bg1"/>
-                </a:solidFill>
-              </a:rPr>
-              <a:t>In Slide</a:t>
-            </a:r>
-            <a:r>
-              <a:rPr lang="en-US" sz="2400" b="1" dirty="0" smtClean="0">
-                <a:solidFill>
-                  <a:schemeClr val="bg1"/>
-                </a:solidFill>
-              </a:rPr>
-              <a:t>”</a:t>
+              <a:t>“Animate In Slide”</a:t>
             </a:r>
             <a:r>
               <a:rPr lang="en-US" sz="2400" dirty="0" smtClean="0">
@@ -23346,23 +23301,7 @@
                   <a:schemeClr val="bg1"/>
                 </a:solidFill>
               </a:rPr>
-              <a:t> </a:t>
-            </a:r>
-            <a:r>
-              <a:rPr lang="en-US" sz="2400" dirty="0" smtClean="0">
-                <a:solidFill>
-                  <a:schemeClr val="bg1"/>
-                </a:solidFill>
-              </a:rPr>
-              <a:t>button in the </a:t>
-            </a:r>
-            <a:r>
-              <a:rPr lang="en-US" sz="2400" dirty="0" smtClean="0">
-                <a:solidFill>
-                  <a:schemeClr val="bg1"/>
-                </a:solidFill>
-              </a:rPr>
-              <a:t>ribbon. </a:t>
+              <a:t> button in the ribbon. </a:t>
             </a:r>
           </a:p>
           <a:p>
@@ -23435,11 +23374,7 @@
           <a:p>
             <a:r>
               <a:rPr lang="en-US" dirty="0" smtClean="0"/>
-              <a:t>Animate in Slide:: </a:t>
-            </a:r>
-            <a:r>
-              <a:rPr lang="en-US" dirty="0" smtClean="0"/>
-              <a:t>normal shapes</a:t>
+              <a:t>Animate in Slide:: normal shapes</a:t>
             </a:r>
             <a:endParaRPr lang="en-SG" dirty="0"/>
           </a:p>
@@ -24394,11 +24329,11 @@
   <p:clrMapOvr>
     <a:masterClrMapping/>
   </p:clrMapOvr>
-  <mc:AlternateContent xmlns:mc="http://schemas.openxmlformats.org/markup-compatibility/2006">
-    <mc:Choice xmlns:p14="http://schemas.microsoft.com/office/powerpoint/2010/main" Requires="p14">
+  <mc:AlternateContent xmlns:mc="http://schemas.openxmlformats.org/markup-compatibility/2006" xmlns:p14="http://schemas.microsoft.com/office/powerpoint/2010/main">
+    <mc:Choice Requires="p14">
       <p:transition p14:dur="0"/>
     </mc:Choice>
-    <mc:Fallback>
+    <mc:Fallback xmlns="">
       <p:transition/>
     </mc:Fallback>
   </mc:AlternateContent>
@@ -25057,7 +24992,7 @@
       </p:sp>
       <p:sp>
         <p:nvSpPr>
-          <p:cNvPr id="3" name="Rectangle 2"/>
+          <p:cNvPr id="3" name="InSlideAnimateShape38c5e9df-98b2-4f67-b6bc-41b23e3c94e4"/>
           <p:cNvSpPr>
             <a:spLocks/>
           </p:cNvSpPr>
@@ -25113,7 +25048,7 @@
       </p:sp>
       <p:sp>
         <p:nvSpPr>
-          <p:cNvPr id="6" name="Rectangle 5"/>
+          <p:cNvPr id="6" name="InSlideAnimateShape5bd29553-1ef5-4c8c-aff3-4c1c45fa161e"/>
           <p:cNvSpPr>
             <a:spLocks/>
           </p:cNvSpPr>
@@ -25169,7 +25104,7 @@
       </p:sp>
       <p:sp>
         <p:nvSpPr>
-          <p:cNvPr id="7" name="Rectangle 6"/>
+          <p:cNvPr id="7" name="InSlideAnimateShapeed57f62c-e310-4168-8378-b251a5aa4ed4"/>
           <p:cNvSpPr/>
           <p:nvPr/>
         </p:nvSpPr>
@@ -25337,7 +25272,7 @@
       </p:sp>
       <p:sp>
         <p:nvSpPr>
-          <p:cNvPr id="11" name="text 3"/>
+          <p:cNvPr id="12" name="text 3"/>
           <p:cNvSpPr txBox="1"/>
           <p:nvPr/>
         </p:nvSpPr>
@@ -25376,7 +25311,7 @@
     </p:spTree>
     <p:extLst>
       <p:ext uri="{BB962C8B-B14F-4D97-AF65-F5344CB8AC3E}">
-        <p14:creationId xmlns:p14="http://schemas.microsoft.com/office/powerpoint/2010/main" val="113952608"/>
+        <p14:creationId xmlns:p14="http://schemas.microsoft.com/office/powerpoint/2010/main" val="2052353656"/>
       </p:ext>
     </p:extLst>
   </p:cSld>
@@ -25412,59 +25347,14 @@
                             </p:stCondLst>
                             <p:childTnLst>
                               <p:par>
-                                <p:cTn id="5" presetID="1" presetClass="entr" presetSubtype="0" fill="hold" grpId="0" nodeType="clickEffect">
-                                  <p:stCondLst>
-                                    <p:cond delay="0"/>
-                                  </p:stCondLst>
-                                  <p:childTnLst>
-                                    <p:set>
-                                      <p:cBhvr>
-                                        <p:cTn id="6" dur="1" fill="hold">
-                                          <p:stCondLst>
-                                            <p:cond delay="0"/>
-                                          </p:stCondLst>
-                                        </p:cTn>
-                                        <p:tgtEl>
-                                          <p:spTgt spid="3"/>
-                                        </p:tgtEl>
-                                        <p:attrNameLst>
-                                          <p:attrName>style.visibility</p:attrName>
-                                        </p:attrNameLst>
-                                      </p:cBhvr>
-                                      <p:to>
-                                        <p:strVal val="visible"/>
-                                      </p:to>
-                                    </p:set>
-                                  </p:childTnLst>
-                                </p:cTn>
-                              </p:par>
-                            </p:childTnLst>
-                          </p:cTn>
-                        </p:par>
-                      </p:childTnLst>
-                    </p:cTn>
-                  </p:par>
-                  <p:par>
-                    <p:cTn id="7" fill="hold">
-                      <p:stCondLst>
-                        <p:cond delay="indefinite"/>
-                      </p:stCondLst>
-                      <p:childTnLst>
-                        <p:par>
-                          <p:cTn id="8" fill="hold">
-                            <p:stCondLst>
-                              <p:cond delay="0"/>
-                            </p:stCondLst>
-                            <p:childTnLst>
-                              <p:par>
-                                <p:cTn id="9" presetID="42" presetClass="path" presetSubtype="0" fill="hold" grpId="1" nodeType="clickEffect">
+                                <p:cTn id="5" presetID="42" presetClass="path" presetSubtype="0" fill="hold" grpId="0" nodeType="clickEffect">
                                   <p:stCondLst>
                                     <p:cond delay="0"/>
                                   </p:stCondLst>
                                   <p:childTnLst>
                                     <p:animMotion origin="layout" path="M 0 0 C -0.001488071 0.07380944 -0.001488071 0.07380944 -0.002976142 0.1476189 E" pathEditMode="relative" ptsTypes="">
                                       <p:cBhvr>
-                                        <p:cTn id="10" dur="500" fill="hold"/>
+                                        <p:cTn id="6" dur="500" fill="hold"/>
                                         <p:tgtEl>
                                           <p:spTgt spid="3"/>
                                         </p:tgtEl>
@@ -25478,14 +25368,14 @@
                                 </p:cTn>
                               </p:par>
                               <p:par>
-                                <p:cTn id="11" presetID="6" presetClass="emph" presetSubtype="0" fill="hold" grpId="2" nodeType="withEffect">
+                                <p:cTn id="7" presetID="6" presetClass="emph" presetSubtype="0" fill="hold" grpId="1" nodeType="withEffect">
                                   <p:stCondLst>
                                     <p:cond delay="0"/>
                                   </p:stCondLst>
                                   <p:childTnLst>
                                     <p:animScale>
                                       <p:cBhvr>
-                                        <p:cTn id="12" dur="500" fill="hold"/>
+                                        <p:cTn id="8" dur="500" fill="hold"/>
                                         <p:tgtEl>
                                           <p:spTgt spid="3"/>
                                         </p:tgtEl>
@@ -25499,20 +25389,20 @@
                           </p:cTn>
                         </p:par>
                         <p:par>
-                          <p:cTn id="13" fill="hold">
+                          <p:cTn id="9" fill="hold">
                             <p:stCondLst>
                               <p:cond delay="500"/>
                             </p:stCondLst>
                             <p:childTnLst>
                               <p:par>
-                                <p:cTn id="14" presetID="1" presetClass="entr" presetSubtype="0" fill="hold" grpId="0" nodeType="afterEffect">
+                                <p:cTn id="10" presetID="1" presetClass="entr" presetSubtype="0" fill="hold" grpId="0" nodeType="afterEffect">
                                   <p:stCondLst>
                                     <p:cond delay="0"/>
                                   </p:stCondLst>
                                   <p:childTnLst>
                                     <p:set>
                                       <p:cBhvr>
-                                        <p:cTn id="15" dur="1" fill="hold">
+                                        <p:cTn id="11" dur="1" fill="hold">
                                           <p:stCondLst>
                                             <p:cond delay="0"/>
                                           </p:stCondLst>
@@ -25531,26 +25421,25 @@
                                   </p:childTnLst>
                                 </p:cTn>
                               </p:par>
-                            </p:childTnLst>
-                          </p:cTn>
-                        </p:par>
-                        <p:par>
-                          <p:cTn id="16" fill="hold">
-                            <p:stCondLst>
-                              <p:cond delay="500"/>
-                            </p:stCondLst>
-                            <p:childTnLst>
                               <p:par>
-                                <p:cTn id="17" presetID="1" presetClass="exit" presetSubtype="0" fill="hold" grpId="3" nodeType="afterEffect">
+                                <p:cTn id="12" presetID="10" presetClass="exit" presetSubtype="0" fill="hold" grpId="2" nodeType="withEffect">
                                   <p:stCondLst>
                                     <p:cond delay="0"/>
                                   </p:stCondLst>
                                   <p:childTnLst>
+                                    <p:animEffect transition="out" filter="fade">
+                                      <p:cBhvr>
+                                        <p:cTn id="13" dur="500"/>
+                                        <p:tgtEl>
+                                          <p:spTgt spid="3"/>
+                                        </p:tgtEl>
+                                      </p:cBhvr>
+                                    </p:animEffect>
                                     <p:set>
                                       <p:cBhvr>
-                                        <p:cTn id="18" dur="1" fill="hold">
+                                        <p:cTn id="14" dur="1" fill="hold">
                                           <p:stCondLst>
-                                            <p:cond delay="0"/>
+                                            <p:cond delay="499"/>
                                           </p:stCondLst>
                                         </p:cTn>
                                         <p:tgtEl>
@@ -25574,26 +25463,26 @@
                     </p:cTn>
                   </p:par>
                   <p:par>
-                    <p:cTn id="19" fill="hold">
+                    <p:cTn id="15" fill="hold">
                       <p:stCondLst>
                         <p:cond delay="indefinite"/>
                       </p:stCondLst>
                       <p:childTnLst>
                         <p:par>
-                          <p:cTn id="20" fill="hold">
+                          <p:cTn id="16" fill="hold">
                             <p:stCondLst>
                               <p:cond delay="0"/>
                             </p:stCondLst>
                             <p:childTnLst>
                               <p:par>
-                                <p:cTn id="21" presetID="42" presetClass="path" presetSubtype="0" fill="hold" grpId="1" nodeType="clickEffect">
+                                <p:cTn id="17" presetID="42" presetClass="path" presetSubtype="0" fill="hold" grpId="1" nodeType="clickEffect">
                                   <p:stCondLst>
                                     <p:cond delay="0"/>
                                   </p:stCondLst>
                                   <p:childTnLst>
                                     <p:animMotion origin="layout" path="M 0 0 C -0.002678596 0.08174619 -0.002678596 0.08174619 -0.005357191 0.1634924 E" pathEditMode="relative" ptsTypes="">
                                       <p:cBhvr>
-                                        <p:cTn id="22" dur="500" fill="hold"/>
+                                        <p:cTn id="18" dur="500" fill="hold"/>
                                         <p:tgtEl>
                                           <p:spTgt spid="6"/>
                                         </p:tgtEl>
@@ -25607,14 +25496,14 @@
                                 </p:cTn>
                               </p:par>
                               <p:par>
-                                <p:cTn id="23" presetID="6" presetClass="emph" presetSubtype="0" fill="hold" grpId="2" nodeType="withEffect">
+                                <p:cTn id="19" presetID="6" presetClass="emph" presetSubtype="0" fill="hold" grpId="2" nodeType="withEffect">
                                   <p:stCondLst>
                                     <p:cond delay="0"/>
                                   </p:stCondLst>
                                   <p:childTnLst>
                                     <p:animScale>
                                       <p:cBhvr>
-                                        <p:cTn id="24" dur="500" fill="hold"/>
+                                        <p:cTn id="20" dur="500" fill="hold"/>
                                         <p:tgtEl>
                                           <p:spTgt spid="6"/>
                                         </p:tgtEl>
@@ -25628,20 +25517,20 @@
                           </p:cTn>
                         </p:par>
                         <p:par>
-                          <p:cTn id="25" fill="hold">
+                          <p:cTn id="21" fill="hold">
                             <p:stCondLst>
                               <p:cond delay="500"/>
                             </p:stCondLst>
                             <p:childTnLst>
                               <p:par>
-                                <p:cTn id="26" presetID="1" presetClass="entr" presetSubtype="0" fill="hold" grpId="0" nodeType="afterEffect">
+                                <p:cTn id="22" presetID="1" presetClass="entr" presetSubtype="0" fill="hold" grpId="0" nodeType="afterEffect">
                                   <p:stCondLst>
                                     <p:cond delay="0"/>
                                   </p:stCondLst>
                                   <p:childTnLst>
                                     <p:set>
                                       <p:cBhvr>
-                                        <p:cTn id="27" dur="1" fill="hold">
+                                        <p:cTn id="23" dur="1" fill="hold">
                                           <p:stCondLst>
                                             <p:cond delay="0"/>
                                           </p:stCondLst>
@@ -25660,26 +25549,25 @@
                                   </p:childTnLst>
                                 </p:cTn>
                               </p:par>
-                            </p:childTnLst>
-                          </p:cTn>
-                        </p:par>
-                        <p:par>
-                          <p:cTn id="28" fill="hold">
-                            <p:stCondLst>
-                              <p:cond delay="500"/>
-                            </p:stCondLst>
-                            <p:childTnLst>
                               <p:par>
-                                <p:cTn id="29" presetID="1" presetClass="exit" presetSubtype="0" fill="hold" grpId="3" nodeType="afterEffect">
+                                <p:cTn id="24" presetID="10" presetClass="exit" presetSubtype="0" fill="hold" grpId="3" nodeType="withEffect">
                                   <p:stCondLst>
                                     <p:cond delay="0"/>
                                   </p:stCondLst>
                                   <p:childTnLst>
+                                    <p:animEffect transition="out" filter="fade">
+                                      <p:cBhvr>
+                                        <p:cTn id="25" dur="500"/>
+                                        <p:tgtEl>
+                                          <p:spTgt spid="6"/>
+                                        </p:tgtEl>
+                                      </p:cBhvr>
+                                    </p:animEffect>
                                     <p:set>
                                       <p:cBhvr>
-                                        <p:cTn id="30" dur="1" fill="hold">
+                                        <p:cTn id="26" dur="1" fill="hold">
                                           <p:stCondLst>
-                                            <p:cond delay="0"/>
+                                            <p:cond delay="499"/>
                                           </p:stCondLst>
                                         </p:cTn>
                                         <p:tgtEl>
@@ -25697,28 +25585,28 @@
                                 </p:cTn>
                               </p:par>
                               <p:par>
-                                <p:cTn id="31" presetID="10" presetClass="exit" presetSubtype="0" fill="hold" grpId="0" nodeType="withEffect">
+                                <p:cTn id="27" presetID="10" presetClass="exit" presetSubtype="0" fill="hold" grpId="0" nodeType="withEffect">
                                   <p:stCondLst>
                                     <p:cond delay="0"/>
                                   </p:stCondLst>
                                   <p:childTnLst>
                                     <p:animEffect transition="out" filter="fade">
                                       <p:cBhvr>
-                                        <p:cTn id="32" dur="500"/>
+                                        <p:cTn id="28" dur="500"/>
                                         <p:tgtEl>
-                                          <p:spTgt spid="11"/>
+                                          <p:spTgt spid="12"/>
                                         </p:tgtEl>
                                       </p:cBhvr>
                                     </p:animEffect>
                                     <p:set>
                                       <p:cBhvr>
-                                        <p:cTn id="33" dur="1" fill="hold">
+                                        <p:cTn id="29" dur="1" fill="hold">
                                           <p:stCondLst>
                                             <p:cond delay="499"/>
                                           </p:stCondLst>
                                         </p:cTn>
                                         <p:tgtEl>
-                                          <p:spTgt spid="11"/>
+                                          <p:spTgt spid="12"/>
                                         </p:tgtEl>
                                         <p:attrNameLst>
                                           <p:attrName>style.visibility</p:attrName>
@@ -25762,13 +25650,12 @@
       <p:bldP spid="3" grpId="0" animBg="1"/>
       <p:bldP spid="3" grpId="1" animBg="1"/>
       <p:bldP spid="3" grpId="2" animBg="1"/>
-      <p:bldP spid="3" grpId="3" animBg="1"/>
       <p:bldP spid="6" grpId="0" animBg="1"/>
       <p:bldP spid="6" grpId="1" animBg="1"/>
       <p:bldP spid="6" grpId="2" animBg="1"/>
       <p:bldP spid="6" grpId="3" animBg="1"/>
       <p:bldP spid="7" grpId="0" animBg="1"/>
-      <p:bldP spid="11" grpId="0"/>
+      <p:bldP spid="12" grpId="0"/>
     </p:bldLst>
   </p:timing>
 </p:sld>
@@ -25808,15 +25695,7 @@
           <a:p>
             <a:r>
               <a:rPr lang="en-US" dirty="0" smtClean="0"/>
-              <a:t>Animate in Slide:: </a:t>
-            </a:r>
-            <a:r>
-              <a:rPr lang="en-US" dirty="0" smtClean="0"/>
-              <a:t>Shapes with </a:t>
-            </a:r>
-            <a:r>
-              <a:rPr lang="en-US" dirty="0" smtClean="0"/>
-              <a:t>rotation</a:t>
+              <a:t>Animate in Slide:: Shapes with rotation</a:t>
             </a:r>
             <a:endParaRPr lang="en-SG" dirty="0"/>
           </a:p>
@@ -26421,8 +26300,8 @@
             <a:chExt cx="965" cy="972"/>
           </a:xfrm>
         </p:grpSpPr>
-        <mc:AlternateContent xmlns:mc="http://schemas.openxmlformats.org/markup-compatibility/2006">
-          <mc:Choice xmlns:p14="http://schemas.microsoft.com/office/powerpoint/2010/main" Requires="p14">
+        <mc:AlternateContent xmlns:mc="http://schemas.openxmlformats.org/markup-compatibility/2006" xmlns:p14="http://schemas.microsoft.com/office/powerpoint/2010/main">
+          <mc:Choice Requires="p14">
             <p:contentPart p14:bwMode="auto" r:id="rId2">
               <p14:nvContentPartPr>
                 <p14:cNvPr id="51207" name="Ink 3"/>
@@ -26437,7 +26316,7 @@
               </p14:xfrm>
             </p:contentPart>
           </mc:Choice>
-          <mc:Fallback>
+          <mc:Fallback xmlns="">
             <p:pic>
               <p:nvPicPr>
                 <p:cNvPr id="51207" name="Ink 3"/>
@@ -26464,8 +26343,8 @@
             </p:pic>
           </mc:Fallback>
         </mc:AlternateContent>
-        <mc:AlternateContent xmlns:mc="http://schemas.openxmlformats.org/markup-compatibility/2006">
-          <mc:Choice xmlns:p14="http://schemas.microsoft.com/office/powerpoint/2010/main" Requires="p14">
+        <mc:AlternateContent xmlns:mc="http://schemas.openxmlformats.org/markup-compatibility/2006" xmlns:p14="http://schemas.microsoft.com/office/powerpoint/2010/main">
+          <mc:Choice Requires="p14">
             <p:contentPart p14:bwMode="auto" r:id="rId4">
               <p14:nvContentPartPr>
                 <p14:cNvPr id="51208" name="Ink 4"/>
@@ -26480,7 +26359,7 @@
               </p14:xfrm>
             </p:contentPart>
           </mc:Choice>
-          <mc:Fallback>
+          <mc:Fallback xmlns="">
             <p:pic>
               <p:nvPicPr>
                 <p:cNvPr id="51208" name="Ink 4"/>
@@ -26524,8 +26403,8 @@
             <a:chExt cx="872" cy="936"/>
           </a:xfrm>
         </p:grpSpPr>
-        <mc:AlternateContent xmlns:mc="http://schemas.openxmlformats.org/markup-compatibility/2006">
-          <mc:Choice xmlns:p14="http://schemas.microsoft.com/office/powerpoint/2010/main" Requires="p14">
+        <mc:AlternateContent xmlns:mc="http://schemas.openxmlformats.org/markup-compatibility/2006" xmlns:p14="http://schemas.microsoft.com/office/powerpoint/2010/main">
+          <mc:Choice Requires="p14">
             <p:contentPart p14:bwMode="auto" r:id="rId6">
               <p14:nvContentPartPr>
                 <p14:cNvPr id="51210" name="Ink 7"/>
@@ -26540,7 +26419,7 @@
               </p14:xfrm>
             </p:contentPart>
           </mc:Choice>
-          <mc:Fallback>
+          <mc:Fallback xmlns="">
             <p:pic>
               <p:nvPicPr>
                 <p:cNvPr id="51210" name="Ink 7"/>
@@ -26567,8 +26446,8 @@
             </p:pic>
           </mc:Fallback>
         </mc:AlternateContent>
-        <mc:AlternateContent xmlns:mc="http://schemas.openxmlformats.org/markup-compatibility/2006">
-          <mc:Choice xmlns:p14="http://schemas.microsoft.com/office/powerpoint/2010/main" Requires="p14">
+        <mc:AlternateContent xmlns:mc="http://schemas.openxmlformats.org/markup-compatibility/2006" xmlns:p14="http://schemas.microsoft.com/office/powerpoint/2010/main">
+          <mc:Choice Requires="p14">
             <p:contentPart p14:bwMode="auto" r:id="rId8">
               <p14:nvContentPartPr>
                 <p14:cNvPr id="51211" name="Ink 8"/>
@@ -26583,7 +26462,7 @@
               </p14:xfrm>
             </p:contentPart>
           </mc:Choice>
-          <mc:Fallback>
+          <mc:Fallback xmlns="">
             <p:pic>
               <p:nvPicPr>
                 <p:cNvPr id="51211" name="Ink 8"/>
@@ -26627,8 +26506,8 @@
             <a:chExt cx="1013" cy="1010"/>
           </a:xfrm>
         </p:grpSpPr>
-        <mc:AlternateContent xmlns:mc="http://schemas.openxmlformats.org/markup-compatibility/2006">
-          <mc:Choice xmlns:p14="http://schemas.microsoft.com/office/powerpoint/2010/main" Requires="p14">
+        <mc:AlternateContent xmlns:mc="http://schemas.openxmlformats.org/markup-compatibility/2006" xmlns:p14="http://schemas.microsoft.com/office/powerpoint/2010/main">
+          <mc:Choice Requires="p14">
             <p:contentPart p14:bwMode="auto" r:id="rId10">
               <p14:nvContentPartPr>
                 <p14:cNvPr id="51213" name="Ink 13"/>
@@ -26643,7 +26522,7 @@
               </p14:xfrm>
             </p:contentPart>
           </mc:Choice>
-          <mc:Fallback>
+          <mc:Fallback xmlns="">
             <p:pic>
               <p:nvPicPr>
                 <p:cNvPr id="51213" name="Ink 13"/>
@@ -26670,8 +26549,8 @@
             </p:pic>
           </mc:Fallback>
         </mc:AlternateContent>
-        <mc:AlternateContent xmlns:mc="http://schemas.openxmlformats.org/markup-compatibility/2006">
-          <mc:Choice xmlns:p14="http://schemas.microsoft.com/office/powerpoint/2010/main" Requires="p14">
+        <mc:AlternateContent xmlns:mc="http://schemas.openxmlformats.org/markup-compatibility/2006" xmlns:p14="http://schemas.microsoft.com/office/powerpoint/2010/main">
+          <mc:Choice Requires="p14">
             <p:contentPart p14:bwMode="auto" r:id="rId12">
               <p14:nvContentPartPr>
                 <p14:cNvPr id="51214" name="Ink 14"/>
@@ -26686,7 +26565,7 @@
               </p14:xfrm>
             </p:contentPart>
           </mc:Choice>
-          <mc:Fallback>
+          <mc:Fallback xmlns="">
             <p:pic>
               <p:nvPicPr>
                 <p:cNvPr id="51214" name="Ink 14"/>
@@ -26958,11 +26837,11 @@
   <p:clrMapOvr>
     <a:masterClrMapping/>
   </p:clrMapOvr>
-  <mc:AlternateContent xmlns:mc="http://schemas.openxmlformats.org/markup-compatibility/2006">
-    <mc:Choice xmlns:p14="http://schemas.microsoft.com/office/powerpoint/2010/main" Requires="p14">
+  <mc:AlternateContent xmlns:mc="http://schemas.openxmlformats.org/markup-compatibility/2006" xmlns:p14="http://schemas.microsoft.com/office/powerpoint/2010/main">
+    <mc:Choice Requires="p14">
       <p:transition p14:dur="0"/>
     </mc:Choice>
-    <mc:Fallback>
+    <mc:Fallback xmlns="">
       <p:transition/>
     </mc:Fallback>
   </mc:AlternateContent>
@@ -27555,8 +27434,8 @@
             <a:chExt cx="965" cy="972"/>
           </a:xfrm>
         </p:grpSpPr>
-        <mc:AlternateContent xmlns:mc="http://schemas.openxmlformats.org/markup-compatibility/2006">
-          <mc:Choice xmlns:p14="http://schemas.microsoft.com/office/powerpoint/2010/main" Requires="p14">
+        <mc:AlternateContent xmlns:mc="http://schemas.openxmlformats.org/markup-compatibility/2006" xmlns:p14="http://schemas.microsoft.com/office/powerpoint/2010/main">
+          <mc:Choice Requires="p14">
             <p:contentPart p14:bwMode="auto" r:id="rId2">
               <p14:nvContentPartPr>
                 <p14:cNvPr id="51207" name="Ink 3"/>
@@ -27571,7 +27450,7 @@
               </p14:xfrm>
             </p:contentPart>
           </mc:Choice>
-          <mc:Fallback>
+          <mc:Fallback xmlns="">
             <p:pic>
               <p:nvPicPr>
                 <p:cNvPr id="51207" name="Ink 3"/>
@@ -27598,8 +27477,8 @@
             </p:pic>
           </mc:Fallback>
         </mc:AlternateContent>
-        <mc:AlternateContent xmlns:mc="http://schemas.openxmlformats.org/markup-compatibility/2006">
-          <mc:Choice xmlns:p14="http://schemas.microsoft.com/office/powerpoint/2010/main" Requires="p14">
+        <mc:AlternateContent xmlns:mc="http://schemas.openxmlformats.org/markup-compatibility/2006" xmlns:p14="http://schemas.microsoft.com/office/powerpoint/2010/main">
+          <mc:Choice Requires="p14">
             <p:contentPart p14:bwMode="auto" r:id="rId4">
               <p14:nvContentPartPr>
                 <p14:cNvPr id="51208" name="Ink 4"/>
@@ -27614,7 +27493,7 @@
               </p14:xfrm>
             </p:contentPart>
           </mc:Choice>
-          <mc:Fallback>
+          <mc:Fallback xmlns="">
             <p:pic>
               <p:nvPicPr>
                 <p:cNvPr id="51208" name="Ink 4"/>
@@ -27658,8 +27537,8 @@
             <a:chExt cx="872" cy="936"/>
           </a:xfrm>
         </p:grpSpPr>
-        <mc:AlternateContent xmlns:mc="http://schemas.openxmlformats.org/markup-compatibility/2006">
-          <mc:Choice xmlns:p14="http://schemas.microsoft.com/office/powerpoint/2010/main" Requires="p14">
+        <mc:AlternateContent xmlns:mc="http://schemas.openxmlformats.org/markup-compatibility/2006" xmlns:p14="http://schemas.microsoft.com/office/powerpoint/2010/main">
+          <mc:Choice Requires="p14">
             <p:contentPart p14:bwMode="auto" r:id="rId6">
               <p14:nvContentPartPr>
                 <p14:cNvPr id="51210" name="Ink 7"/>
@@ -27674,7 +27553,7 @@
               </p14:xfrm>
             </p:contentPart>
           </mc:Choice>
-          <mc:Fallback>
+          <mc:Fallback xmlns="">
             <p:pic>
               <p:nvPicPr>
                 <p:cNvPr id="51210" name="Ink 7"/>
@@ -27701,8 +27580,8 @@
             </p:pic>
           </mc:Fallback>
         </mc:AlternateContent>
-        <mc:AlternateContent xmlns:mc="http://schemas.openxmlformats.org/markup-compatibility/2006">
-          <mc:Choice xmlns:p14="http://schemas.microsoft.com/office/powerpoint/2010/main" Requires="p14">
+        <mc:AlternateContent xmlns:mc="http://schemas.openxmlformats.org/markup-compatibility/2006" xmlns:p14="http://schemas.microsoft.com/office/powerpoint/2010/main">
+          <mc:Choice Requires="p14">
             <p:contentPart p14:bwMode="auto" r:id="rId8">
               <p14:nvContentPartPr>
                 <p14:cNvPr id="51211" name="Ink 8"/>
@@ -27717,7 +27596,7 @@
               </p14:xfrm>
             </p:contentPart>
           </mc:Choice>
-          <mc:Fallback>
+          <mc:Fallback xmlns="">
             <p:pic>
               <p:nvPicPr>
                 <p:cNvPr id="51211" name="Ink 8"/>
@@ -27761,8 +27640,8 @@
             <a:chExt cx="1013" cy="1010"/>
           </a:xfrm>
         </p:grpSpPr>
-        <mc:AlternateContent xmlns:mc="http://schemas.openxmlformats.org/markup-compatibility/2006">
-          <mc:Choice xmlns:p14="http://schemas.microsoft.com/office/powerpoint/2010/main" Requires="p14">
+        <mc:AlternateContent xmlns:mc="http://schemas.openxmlformats.org/markup-compatibility/2006" xmlns:p14="http://schemas.microsoft.com/office/powerpoint/2010/main">
+          <mc:Choice Requires="p14">
             <p:contentPart p14:bwMode="auto" r:id="rId10">
               <p14:nvContentPartPr>
                 <p14:cNvPr id="51213" name="Ink 13"/>
@@ -27777,7 +27656,7 @@
               </p14:xfrm>
             </p:contentPart>
           </mc:Choice>
-          <mc:Fallback>
+          <mc:Fallback xmlns="">
             <p:pic>
               <p:nvPicPr>
                 <p:cNvPr id="51213" name="Ink 13"/>
@@ -27804,8 +27683,8 @@
             </p:pic>
           </mc:Fallback>
         </mc:AlternateContent>
-        <mc:AlternateContent xmlns:mc="http://schemas.openxmlformats.org/markup-compatibility/2006">
-          <mc:Choice xmlns:p14="http://schemas.microsoft.com/office/powerpoint/2010/main" Requires="p14">
+        <mc:AlternateContent xmlns:mc="http://schemas.openxmlformats.org/markup-compatibility/2006" xmlns:p14="http://schemas.microsoft.com/office/powerpoint/2010/main">
+          <mc:Choice Requires="p14">
             <p:contentPart p14:bwMode="auto" r:id="rId12">
               <p14:nvContentPartPr>
                 <p14:cNvPr id="51214" name="Ink 14"/>
@@ -27820,7 +27699,7 @@
               </p14:xfrm>
             </p:contentPart>
           </mc:Choice>
-          <mc:Fallback>
+          <mc:Fallback xmlns="">
             <p:pic>
               <p:nvPicPr>
                 <p:cNvPr id="51214" name="Ink 14"/>
@@ -28634,11 +28513,11 @@
   <p:clrMapOvr>
     <a:masterClrMapping/>
   </p:clrMapOvr>
-  <mc:AlternateContent xmlns:mc="http://schemas.openxmlformats.org/markup-compatibility/2006">
-    <mc:Choice xmlns:p14="http://schemas.microsoft.com/office/powerpoint/2010/main" Requires="p14">
+  <mc:AlternateContent xmlns:mc="http://schemas.openxmlformats.org/markup-compatibility/2006" xmlns:p14="http://schemas.microsoft.com/office/powerpoint/2010/main">
+    <mc:Choice Requires="p14">
       <p:transition p14:dur="0"/>
     </mc:Choice>
-    <mc:Fallback>
+    <mc:Fallback xmlns="">
       <p:transition/>
     </mc:Fallback>
   </mc:AlternateContent>

</xml_diff>